<commit_message>
Saving in case my computer crashes trying to run eeg lab :')
</commit_message>
<xml_diff>
--- a/Writeups/Notes/Design Figures.pptx
+++ b/Writeups/Notes/Design Figures.pptx
@@ -8,6 +8,7 @@
     <p:sldId id="256" r:id="rId2"/>
     <p:sldId id="258" r:id="rId3"/>
     <p:sldId id="257" r:id="rId4"/>
+    <p:sldId id="259" r:id="rId5"/>
   </p:sldIdLst>
   <p:sldSz cx="12192000" cy="6858000"/>
   <p:notesSz cx="6858000" cy="9144000"/>
@@ -261,7 +262,7 @@
           <a:p>
             <a:fld id="{914BB29B-1D65-452B-8FC4-46EDB4DF1FB8}" type="datetimeFigureOut">
               <a:rPr lang="en-US" smtClean="0"/>
-              <a:t>12/11/2022</a:t>
+              <a:t>3/30/2023</a:t>
             </a:fld>
             <a:endParaRPr lang="en-US"/>
           </a:p>
@@ -459,7 +460,7 @@
           <a:p>
             <a:fld id="{914BB29B-1D65-452B-8FC4-46EDB4DF1FB8}" type="datetimeFigureOut">
               <a:rPr lang="en-US" smtClean="0"/>
-              <a:t>12/11/2022</a:t>
+              <a:t>3/30/2023</a:t>
             </a:fld>
             <a:endParaRPr lang="en-US"/>
           </a:p>
@@ -667,7 +668,7 @@
           <a:p>
             <a:fld id="{914BB29B-1D65-452B-8FC4-46EDB4DF1FB8}" type="datetimeFigureOut">
               <a:rPr lang="en-US" smtClean="0"/>
-              <a:t>12/11/2022</a:t>
+              <a:t>3/30/2023</a:t>
             </a:fld>
             <a:endParaRPr lang="en-US"/>
           </a:p>
@@ -865,7 +866,7 @@
           <a:p>
             <a:fld id="{914BB29B-1D65-452B-8FC4-46EDB4DF1FB8}" type="datetimeFigureOut">
               <a:rPr lang="en-US" smtClean="0"/>
-              <a:t>12/11/2022</a:t>
+              <a:t>3/30/2023</a:t>
             </a:fld>
             <a:endParaRPr lang="en-US"/>
           </a:p>
@@ -1140,7 +1141,7 @@
           <a:p>
             <a:fld id="{914BB29B-1D65-452B-8FC4-46EDB4DF1FB8}" type="datetimeFigureOut">
               <a:rPr lang="en-US" smtClean="0"/>
-              <a:t>12/11/2022</a:t>
+              <a:t>3/30/2023</a:t>
             </a:fld>
             <a:endParaRPr lang="en-US"/>
           </a:p>
@@ -1405,7 +1406,7 @@
           <a:p>
             <a:fld id="{914BB29B-1D65-452B-8FC4-46EDB4DF1FB8}" type="datetimeFigureOut">
               <a:rPr lang="en-US" smtClean="0"/>
-              <a:t>12/11/2022</a:t>
+              <a:t>3/30/2023</a:t>
             </a:fld>
             <a:endParaRPr lang="en-US"/>
           </a:p>
@@ -1817,7 +1818,7 @@
           <a:p>
             <a:fld id="{914BB29B-1D65-452B-8FC4-46EDB4DF1FB8}" type="datetimeFigureOut">
               <a:rPr lang="en-US" smtClean="0"/>
-              <a:t>12/11/2022</a:t>
+              <a:t>3/30/2023</a:t>
             </a:fld>
             <a:endParaRPr lang="en-US"/>
           </a:p>
@@ -1958,7 +1959,7 @@
           <a:p>
             <a:fld id="{914BB29B-1D65-452B-8FC4-46EDB4DF1FB8}" type="datetimeFigureOut">
               <a:rPr lang="en-US" smtClean="0"/>
-              <a:t>12/11/2022</a:t>
+              <a:t>3/30/2023</a:t>
             </a:fld>
             <a:endParaRPr lang="en-US"/>
           </a:p>
@@ -2071,7 +2072,7 @@
           <a:p>
             <a:fld id="{914BB29B-1D65-452B-8FC4-46EDB4DF1FB8}" type="datetimeFigureOut">
               <a:rPr lang="en-US" smtClean="0"/>
-              <a:t>12/11/2022</a:t>
+              <a:t>3/30/2023</a:t>
             </a:fld>
             <a:endParaRPr lang="en-US"/>
           </a:p>
@@ -2382,7 +2383,7 @@
           <a:p>
             <a:fld id="{914BB29B-1D65-452B-8FC4-46EDB4DF1FB8}" type="datetimeFigureOut">
               <a:rPr lang="en-US" smtClean="0"/>
-              <a:t>12/11/2022</a:t>
+              <a:t>3/30/2023</a:t>
             </a:fld>
             <a:endParaRPr lang="en-US"/>
           </a:p>
@@ -2670,7 +2671,7 @@
           <a:p>
             <a:fld id="{914BB29B-1D65-452B-8FC4-46EDB4DF1FB8}" type="datetimeFigureOut">
               <a:rPr lang="en-US" smtClean="0"/>
-              <a:t>12/11/2022</a:t>
+              <a:t>3/30/2023</a:t>
             </a:fld>
             <a:endParaRPr lang="en-US"/>
           </a:p>
@@ -2911,7 +2912,7 @@
           <a:p>
             <a:fld id="{914BB29B-1D65-452B-8FC4-46EDB4DF1FB8}" type="datetimeFigureOut">
               <a:rPr lang="en-US" smtClean="0"/>
-              <a:t>12/11/2022</a:t>
+              <a:t>3/30/2023</a:t>
             </a:fld>
             <a:endParaRPr lang="en-US"/>
           </a:p>
@@ -3687,183 +3688,6 @@
           </a:fontRef>
         </p:style>
       </p:cxnSp>
-      <p:grpSp>
-        <p:nvGrpSpPr>
-          <p:cNvPr id="26" name="Group 25">
-            <a:extLst>
-              <a:ext uri="{FF2B5EF4-FFF2-40B4-BE49-F238E27FC236}">
-                <a16:creationId xmlns:a16="http://schemas.microsoft.com/office/drawing/2014/main" id="{291FD4FA-0FB4-301D-CFEA-6D784F4FE345}"/>
-              </a:ext>
-            </a:extLst>
-          </p:cNvPr>
-          <p:cNvGrpSpPr/>
-          <p:nvPr/>
-        </p:nvGrpSpPr>
-        <p:grpSpPr>
-          <a:xfrm>
-            <a:off x="4699885" y="6000118"/>
-            <a:ext cx="2853120" cy="400682"/>
-            <a:chOff x="3298312" y="5032829"/>
-            <a:chExt cx="2853120" cy="400682"/>
-          </a:xfrm>
-        </p:grpSpPr>
-        <p:sp>
-          <p:nvSpPr>
-            <p:cNvPr id="21" name="TextBox 20">
-              <a:extLst>
-                <a:ext uri="{FF2B5EF4-FFF2-40B4-BE49-F238E27FC236}">
-                  <a16:creationId xmlns:a16="http://schemas.microsoft.com/office/drawing/2014/main" id="{075CE6D5-F10E-33B8-A8CC-39C982FF08D0}"/>
-                </a:ext>
-              </a:extLst>
-            </p:cNvPr>
-            <p:cNvSpPr txBox="1"/>
-            <p:nvPr/>
-          </p:nvSpPr>
-          <p:spPr>
-            <a:xfrm>
-              <a:off x="3298312" y="5032829"/>
-              <a:ext cx="867410" cy="400110"/>
-            </a:xfrm>
-            <a:prstGeom prst="rect">
-              <a:avLst/>
-            </a:prstGeom>
-            <a:noFill/>
-          </p:spPr>
-          <p:txBody>
-            <a:bodyPr wrap="square" rtlCol="0">
-              <a:spAutoFit/>
-            </a:bodyPr>
-            <a:lstStyle/>
-            <a:p>
-              <a:r>
-                <a:rPr lang="en-US" sz="2000" b="1" dirty="0">
-                  <a:latin typeface="Sylfaen" panose="010A0502050306030303" pitchFamily="18" charset="0"/>
-                </a:rPr>
-                <a:t>Word</a:t>
-              </a:r>
-              <a:endParaRPr lang="en-US" sz="2800" b="1" dirty="0">
-                <a:latin typeface="Sylfaen" panose="010A0502050306030303" pitchFamily="18" charset="0"/>
-              </a:endParaRPr>
-            </a:p>
-          </p:txBody>
-        </p:sp>
-        <p:sp>
-          <p:nvSpPr>
-            <p:cNvPr id="22" name="TextBox 21">
-              <a:extLst>
-                <a:ext uri="{FF2B5EF4-FFF2-40B4-BE49-F238E27FC236}">
-                  <a16:creationId xmlns:a16="http://schemas.microsoft.com/office/drawing/2014/main" id="{4E80D78E-49B7-F9F7-7874-785D8690C151}"/>
-                </a:ext>
-              </a:extLst>
-            </p:cNvPr>
-            <p:cNvSpPr txBox="1"/>
-            <p:nvPr/>
-          </p:nvSpPr>
-          <p:spPr>
-            <a:xfrm>
-              <a:off x="4879878" y="5033401"/>
-              <a:ext cx="1271554" cy="400110"/>
-            </a:xfrm>
-            <a:prstGeom prst="rect">
-              <a:avLst/>
-            </a:prstGeom>
-            <a:noFill/>
-          </p:spPr>
-          <p:txBody>
-            <a:bodyPr wrap="square" rtlCol="0">
-              <a:spAutoFit/>
-            </a:bodyPr>
-            <a:lstStyle/>
-            <a:p>
-              <a:r>
-                <a:rPr lang="en-US" sz="2000" b="1" dirty="0">
-                  <a:latin typeface="Sylfaen" panose="010A0502050306030303" pitchFamily="18" charset="0"/>
-                </a:rPr>
-                <a:t>Nonword</a:t>
-              </a:r>
-              <a:endParaRPr lang="en-US" b="1" dirty="0">
-                <a:latin typeface="Sylfaen" panose="010A0502050306030303" pitchFamily="18" charset="0"/>
-              </a:endParaRPr>
-            </a:p>
-          </p:txBody>
-        </p:sp>
-        <p:sp>
-          <p:nvSpPr>
-            <p:cNvPr id="23" name="Oval 22">
-              <a:extLst>
-                <a:ext uri="{FF2B5EF4-FFF2-40B4-BE49-F238E27FC236}">
-                  <a16:creationId xmlns:a16="http://schemas.microsoft.com/office/drawing/2014/main" id="{0F993D0E-5D5F-09DC-7E7B-5CAB18ED88BD}"/>
-                </a:ext>
-              </a:extLst>
-            </p:cNvPr>
-            <p:cNvSpPr/>
-            <p:nvPr/>
-          </p:nvSpPr>
-          <p:spPr>
-            <a:xfrm>
-              <a:off x="4312721" y="5043174"/>
-              <a:ext cx="407503" cy="378541"/>
-            </a:xfrm>
-            <a:prstGeom prst="ellipse">
-              <a:avLst/>
-            </a:prstGeom>
-            <a:gradFill flip="none" rotWithShape="1">
-              <a:gsLst>
-                <a:gs pos="65000">
-                  <a:srgbClr val="92D050">
-                    <a:shade val="67500"/>
-                    <a:satMod val="115000"/>
-                  </a:srgbClr>
-                </a:gs>
-                <a:gs pos="100000">
-                  <a:srgbClr val="64952F"/>
-                </a:gs>
-                <a:gs pos="34000">
-                  <a:srgbClr val="86C940"/>
-                </a:gs>
-                <a:gs pos="3000">
-                  <a:srgbClr val="B0E476"/>
-                </a:gs>
-              </a:gsLst>
-              <a:path path="circle">
-                <a:fillToRect l="50000" t="50000" r="50000" b="50000"/>
-              </a:path>
-              <a:tileRect/>
-            </a:gradFill>
-            <a:ln>
-              <a:solidFill>
-                <a:schemeClr val="bg2">
-                  <a:lumMod val="25000"/>
-                </a:schemeClr>
-              </a:solidFill>
-            </a:ln>
-          </p:spPr>
-          <p:style>
-            <a:lnRef idx="2">
-              <a:schemeClr val="accent1">
-                <a:shade val="50000"/>
-              </a:schemeClr>
-            </a:lnRef>
-            <a:fillRef idx="1">
-              <a:schemeClr val="accent1"/>
-            </a:fillRef>
-            <a:effectRef idx="0">
-              <a:schemeClr val="accent1"/>
-            </a:effectRef>
-            <a:fontRef idx="minor">
-              <a:schemeClr val="lt1"/>
-            </a:fontRef>
-          </p:style>
-          <p:txBody>
-            <a:bodyPr rtlCol="0" anchor="ctr"/>
-            <a:lstStyle/>
-            <a:p>
-              <a:pPr algn="ctr"/>
-              <a:endParaRPr lang="en-US" dirty="0"/>
-            </a:p>
-          </p:txBody>
-        </p:sp>
-      </p:grpSp>
       <p:pic>
         <p:nvPicPr>
           <p:cNvPr id="73" name="Graphic 13" descr="User outline">
@@ -3919,7 +3743,7 @@
         </p:nvSpPr>
         <p:spPr bwMode="auto">
           <a:xfrm>
-            <a:off x="5512821" y="5635816"/>
+            <a:off x="5477263" y="5636580"/>
             <a:ext cx="916913" cy="252137"/>
           </a:xfrm>
           <a:prstGeom prst="rect">
@@ -4223,7 +4047,7 @@
                 </p:nvSpPr>
                 <p:spPr bwMode="auto">
                   <a:xfrm>
-                    <a:off x="4104836" y="4103022"/>
+                    <a:off x="4093247" y="4115978"/>
                     <a:ext cx="1136650" cy="277814"/>
                   </a:xfrm>
                   <a:prstGeom prst="rect">
@@ -6950,6 +6774,36 @@
           </p:txBody>
         </p:sp>
       </p:grpSp>
+      <p:pic>
+        <p:nvPicPr>
+          <p:cNvPr id="3" name="Picture 2">
+            <a:extLst>
+              <a:ext uri="{FF2B5EF4-FFF2-40B4-BE49-F238E27FC236}">
+                <a16:creationId xmlns:a16="http://schemas.microsoft.com/office/drawing/2014/main" id="{72C782DD-1C1A-4816-5C6A-6414681CC064}"/>
+              </a:ext>
+            </a:extLst>
+          </p:cNvPr>
+          <p:cNvPicPr>
+            <a:picLocks noChangeAspect="1"/>
+          </p:cNvPicPr>
+          <p:nvPr/>
+        </p:nvPicPr>
+        <p:blipFill>
+          <a:blip r:embed="rId14"/>
+          <a:stretch>
+            <a:fillRect/>
+          </a:stretch>
+        </p:blipFill>
+        <p:spPr>
+          <a:xfrm>
+            <a:off x="4279477" y="5885459"/>
+            <a:ext cx="3397425" cy="749339"/>
+          </a:xfrm>
+          <a:prstGeom prst="rect">
+            <a:avLst/>
+          </a:prstGeom>
+        </p:spPr>
+      </p:pic>
     </p:spTree>
     <p:extLst>
       <p:ext uri="{BB962C8B-B14F-4D97-AF65-F5344CB8AC3E}">
@@ -6980,6 +6834,36 @@
           <a:chExt cx="0" cy="0"/>
         </a:xfrm>
       </p:grpSpPr>
+      <p:pic>
+        <p:nvPicPr>
+          <p:cNvPr id="3" name="Picture 2">
+            <a:extLst>
+              <a:ext uri="{FF2B5EF4-FFF2-40B4-BE49-F238E27FC236}">
+                <a16:creationId xmlns:a16="http://schemas.microsoft.com/office/drawing/2014/main" id="{8FD774E1-CE92-F2DC-C6FF-DCB7565EBDC8}"/>
+              </a:ext>
+            </a:extLst>
+          </p:cNvPr>
+          <p:cNvPicPr>
+            <a:picLocks noChangeAspect="1"/>
+          </p:cNvPicPr>
+          <p:nvPr/>
+        </p:nvPicPr>
+        <p:blipFill>
+          <a:blip r:embed="rId2"/>
+          <a:stretch>
+            <a:fillRect/>
+          </a:stretch>
+        </p:blipFill>
+        <p:spPr>
+          <a:xfrm>
+            <a:off x="8662501" y="3579464"/>
+            <a:ext cx="3024190" cy="667018"/>
+          </a:xfrm>
+          <a:prstGeom prst="rect">
+            <a:avLst/>
+          </a:prstGeom>
+        </p:spPr>
+      </p:pic>
       <p:sp>
         <p:nvSpPr>
           <p:cNvPr id="15" name="Rectangle 12">
@@ -7171,7 +7055,7 @@
         </p:nvSpPr>
         <p:spPr>
           <a:xfrm>
-            <a:off x="946886" y="2880759"/>
+            <a:off x="583819" y="3084095"/>
             <a:ext cx="3308103" cy="1096482"/>
           </a:xfrm>
           <a:prstGeom prst="roundRect">
@@ -7263,7 +7147,7 @@
         </p:nvCxnSpPr>
         <p:spPr>
           <a:xfrm>
-            <a:off x="9093078" y="2287980"/>
+            <a:off x="8730011" y="2491316"/>
             <a:ext cx="455105" cy="417967"/>
           </a:xfrm>
           <a:prstGeom prst="straightConnector1">
@@ -7309,7 +7193,7 @@
         </p:nvCxnSpPr>
         <p:spPr>
           <a:xfrm flipV="1">
-            <a:off x="4130850" y="2225203"/>
+            <a:off x="3767783" y="2428539"/>
             <a:ext cx="455105" cy="417967"/>
           </a:xfrm>
           <a:prstGeom prst="straightConnector1">
@@ -7353,189 +7237,12 @@
         </p:nvGrpSpPr>
         <p:grpSpPr>
           <a:xfrm>
-            <a:off x="9308937" y="2508551"/>
-            <a:ext cx="2042619" cy="1473869"/>
-            <a:chOff x="9746399" y="2188112"/>
-            <a:chExt cx="2434160" cy="1669455"/>
+            <a:off x="9678670" y="2508553"/>
+            <a:ext cx="991852" cy="1133947"/>
+            <a:chOff x="10187005" y="2188112"/>
+            <a:chExt cx="1181976" cy="1284424"/>
           </a:xfrm>
         </p:grpSpPr>
-        <p:grpSp>
-          <p:nvGrpSpPr>
-            <p:cNvPr id="26" name="Group 25">
-              <a:extLst>
-                <a:ext uri="{FF2B5EF4-FFF2-40B4-BE49-F238E27FC236}">
-                  <a16:creationId xmlns:a16="http://schemas.microsoft.com/office/drawing/2014/main" id="{291FD4FA-0FB4-301D-CFEA-6D784F4FE345}"/>
-                </a:ext>
-              </a:extLst>
-            </p:cNvPr>
-            <p:cNvGrpSpPr/>
-            <p:nvPr/>
-          </p:nvGrpSpPr>
-          <p:grpSpPr>
-            <a:xfrm>
-              <a:off x="9746399" y="3549354"/>
-              <a:ext cx="2434160" cy="308213"/>
-              <a:chOff x="3298312" y="5032829"/>
-              <a:chExt cx="2853120" cy="404514"/>
-            </a:xfrm>
-          </p:grpSpPr>
-          <p:sp>
-            <p:nvSpPr>
-              <p:cNvPr id="21" name="TextBox 20">
-                <a:extLst>
-                  <a:ext uri="{FF2B5EF4-FFF2-40B4-BE49-F238E27FC236}">
-                    <a16:creationId xmlns:a16="http://schemas.microsoft.com/office/drawing/2014/main" id="{075CE6D5-F10E-33B8-A8CC-39C982FF08D0}"/>
-                  </a:ext>
-                </a:extLst>
-              </p:cNvPr>
-              <p:cNvSpPr txBox="1"/>
-              <p:nvPr/>
-            </p:nvSpPr>
-            <p:spPr>
-              <a:xfrm>
-                <a:off x="3298312" y="5032829"/>
-                <a:ext cx="867410" cy="403942"/>
-              </a:xfrm>
-              <a:prstGeom prst="rect">
-                <a:avLst/>
-              </a:prstGeom>
-              <a:noFill/>
-            </p:spPr>
-            <p:txBody>
-              <a:bodyPr wrap="square" rtlCol="0">
-                <a:spAutoFit/>
-              </a:bodyPr>
-              <a:lstStyle/>
-              <a:p>
-                <a:r>
-                  <a:rPr lang="en-US" sz="1400" b="1" dirty="0">
-                    <a:latin typeface="Sylfaen" panose="010A0502050306030303" pitchFamily="18" charset="0"/>
-                  </a:rPr>
-                  <a:t>Word</a:t>
-                </a:r>
-                <a:endParaRPr lang="en-US" b="1" dirty="0">
-                  <a:latin typeface="Sylfaen" panose="010A0502050306030303" pitchFamily="18" charset="0"/>
-                </a:endParaRPr>
-              </a:p>
-            </p:txBody>
-          </p:sp>
-          <p:sp>
-            <p:nvSpPr>
-              <p:cNvPr id="22" name="TextBox 21">
-                <a:extLst>
-                  <a:ext uri="{FF2B5EF4-FFF2-40B4-BE49-F238E27FC236}">
-                    <a16:creationId xmlns:a16="http://schemas.microsoft.com/office/drawing/2014/main" id="{4E80D78E-49B7-F9F7-7874-785D8690C151}"/>
-                  </a:ext>
-                </a:extLst>
-              </p:cNvPr>
-              <p:cNvSpPr txBox="1"/>
-              <p:nvPr/>
-            </p:nvSpPr>
-            <p:spPr>
-              <a:xfrm>
-                <a:off x="4879877" y="5033401"/>
-                <a:ext cx="1271555" cy="403942"/>
-              </a:xfrm>
-              <a:prstGeom prst="rect">
-                <a:avLst/>
-              </a:prstGeom>
-              <a:noFill/>
-            </p:spPr>
-            <p:txBody>
-              <a:bodyPr wrap="square" rtlCol="0">
-                <a:spAutoFit/>
-              </a:bodyPr>
-              <a:lstStyle/>
-              <a:p>
-                <a:r>
-                  <a:rPr lang="en-US" sz="1400" b="1" dirty="0">
-                    <a:latin typeface="Sylfaen" panose="010A0502050306030303" pitchFamily="18" charset="0"/>
-                  </a:rPr>
-                  <a:t>Nonword</a:t>
-                </a:r>
-                <a:endParaRPr lang="en-US" sz="1200" b="1" dirty="0">
-                  <a:latin typeface="Sylfaen" panose="010A0502050306030303" pitchFamily="18" charset="0"/>
-                </a:endParaRPr>
-              </a:p>
-            </p:txBody>
-          </p:sp>
-          <p:sp>
-            <p:nvSpPr>
-              <p:cNvPr id="23" name="Oval 22">
-                <a:extLst>
-                  <a:ext uri="{FF2B5EF4-FFF2-40B4-BE49-F238E27FC236}">
-                    <a16:creationId xmlns:a16="http://schemas.microsoft.com/office/drawing/2014/main" id="{0F993D0E-5D5F-09DC-7E7B-5CAB18ED88BD}"/>
-                  </a:ext>
-                </a:extLst>
-              </p:cNvPr>
-              <p:cNvSpPr/>
-              <p:nvPr/>
-            </p:nvSpPr>
-            <p:spPr>
-              <a:xfrm>
-                <a:off x="4312721" y="5043174"/>
-                <a:ext cx="407503" cy="378541"/>
-              </a:xfrm>
-              <a:prstGeom prst="ellipse">
-                <a:avLst/>
-              </a:prstGeom>
-              <a:gradFill flip="none" rotWithShape="1">
-                <a:gsLst>
-                  <a:gs pos="65000">
-                    <a:srgbClr val="92D050">
-                      <a:shade val="67500"/>
-                      <a:satMod val="115000"/>
-                    </a:srgbClr>
-                  </a:gs>
-                  <a:gs pos="100000">
-                    <a:srgbClr val="64952F"/>
-                  </a:gs>
-                  <a:gs pos="34000">
-                    <a:srgbClr val="86C940"/>
-                  </a:gs>
-                  <a:gs pos="3000">
-                    <a:srgbClr val="B0E476"/>
-                  </a:gs>
-                </a:gsLst>
-                <a:path path="circle">
-                  <a:fillToRect l="50000" t="50000" r="50000" b="50000"/>
-                </a:path>
-                <a:tileRect/>
-              </a:gradFill>
-              <a:ln>
-                <a:solidFill>
-                  <a:schemeClr val="bg2">
-                    <a:lumMod val="25000"/>
-                  </a:schemeClr>
-                </a:solidFill>
-              </a:ln>
-            </p:spPr>
-            <p:style>
-              <a:lnRef idx="2">
-                <a:schemeClr val="accent1">
-                  <a:shade val="50000"/>
-                </a:schemeClr>
-              </a:lnRef>
-              <a:fillRef idx="1">
-                <a:schemeClr val="accent1"/>
-              </a:fillRef>
-              <a:effectRef idx="0">
-                <a:schemeClr val="accent1"/>
-              </a:effectRef>
-              <a:fontRef idx="minor">
-                <a:schemeClr val="lt1"/>
-              </a:fontRef>
-            </p:style>
-            <p:txBody>
-              <a:bodyPr rtlCol="0" anchor="ctr"/>
-              <a:lstStyle/>
-              <a:p>
-                <a:pPr algn="ctr"/>
-                <a:endParaRPr lang="en-US" dirty="0"/>
-              </a:p>
-            </p:txBody>
-          </p:sp>
-        </p:grpSp>
         <p:pic>
           <p:nvPicPr>
             <p:cNvPr id="73" name="Graphic 13" descr="User outline">
@@ -7551,13 +7258,13 @@
             <p:nvPr/>
           </p:nvPicPr>
           <p:blipFill>
-            <a:blip r:embed="rId2">
+            <a:blip r:embed="rId3">
               <a:extLst>
                 <a:ext uri="{28A0092B-C50C-407E-A947-70E740481C1C}">
                   <a14:useLocalDpi xmlns:a14="http://schemas.microsoft.com/office/drawing/2010/main" val="0"/>
                 </a:ext>
                 <a:ext uri="{96DAC541-7B7A-43D3-8B79-37D633B846F1}">
-                  <asvg:svgBlip xmlns:asvg="http://schemas.microsoft.com/office/drawing/2016/SVG/main" r:embed="rId3"/>
+                  <asvg:svgBlip xmlns:asvg="http://schemas.microsoft.com/office/drawing/2016/SVG/main" r:embed="rId4"/>
                 </a:ext>
               </a:extLst>
             </a:blip>
@@ -7685,7 +7392,7 @@
         </p:nvCxnSpPr>
         <p:spPr>
           <a:xfrm>
-            <a:off x="4172004" y="4181591"/>
+            <a:off x="3808937" y="4384927"/>
             <a:ext cx="455105" cy="417967"/>
           </a:xfrm>
           <a:prstGeom prst="straightConnector1">
@@ -7731,7 +7438,7 @@
         </p:nvCxnSpPr>
         <p:spPr>
           <a:xfrm flipV="1">
-            <a:off x="9217193" y="4265866"/>
+            <a:off x="8854126" y="4469202"/>
             <a:ext cx="455105" cy="417967"/>
           </a:xfrm>
           <a:prstGeom prst="straightConnector1">
@@ -7775,7 +7482,7 @@
         </p:nvGrpSpPr>
         <p:grpSpPr>
           <a:xfrm>
-            <a:off x="4789974" y="1075298"/>
+            <a:off x="4426907" y="1278634"/>
             <a:ext cx="4094808" cy="2141268"/>
             <a:chOff x="5669462" y="1641193"/>
             <a:chExt cx="4251686" cy="2390916"/>
@@ -7815,10 +7522,10 @@
             </p:nvGrpSpPr>
             <p:grpSpPr>
               <a:xfrm>
-                <a:off x="5262069" y="2326831"/>
-                <a:ext cx="3795630" cy="2048498"/>
-                <a:chOff x="6656276" y="2371135"/>
-                <a:chExt cx="4073822" cy="2048498"/>
+                <a:off x="5262069" y="2289017"/>
+                <a:ext cx="3801101" cy="2086313"/>
+                <a:chOff x="6656276" y="2333321"/>
+                <a:chExt cx="4079694" cy="2086313"/>
               </a:xfrm>
             </p:grpSpPr>
             <p:grpSp>
@@ -7856,13 +7563,13 @@
                   <p:nvPr/>
                 </p:nvPicPr>
                 <p:blipFill>
-                  <a:blip r:embed="rId2">
+                  <a:blip r:embed="rId3">
                     <a:extLst>
                       <a:ext uri="{28A0092B-C50C-407E-A947-70E740481C1C}">
                         <a14:useLocalDpi xmlns:a14="http://schemas.microsoft.com/office/drawing/2010/main" val="0"/>
                       </a:ext>
                       <a:ext uri="{96DAC541-7B7A-43D3-8B79-37D633B846F1}">
-                        <asvg:svgBlip xmlns:asvg="http://schemas.microsoft.com/office/drawing/2016/SVG/main" r:embed="rId3"/>
+                        <asvg:svgBlip xmlns:asvg="http://schemas.microsoft.com/office/drawing/2016/SVG/main" r:embed="rId4"/>
                       </a:ext>
                     </a:extLst>
                   </a:blip>
@@ -8076,10 +7783,10 @@
               </p:nvGrpSpPr>
               <p:grpSpPr>
                 <a:xfrm>
-                  <a:off x="8829077" y="2385017"/>
-                  <a:ext cx="1901021" cy="2034616"/>
-                  <a:chOff x="8839814" y="2499801"/>
-                  <a:chExt cx="1901021" cy="2034616"/>
+                  <a:off x="8821746" y="2333321"/>
+                  <a:ext cx="1914224" cy="2086313"/>
+                  <a:chOff x="8832483" y="2448105"/>
+                  <a:chExt cx="1914224" cy="2086313"/>
                 </a:xfrm>
               </p:grpSpPr>
               <p:grpSp>
@@ -8096,12 +7803,97 @@
                 </p:nvGrpSpPr>
                 <p:grpSpPr>
                   <a:xfrm>
-                    <a:off x="8839814" y="2499801"/>
-                    <a:ext cx="1901021" cy="2034616"/>
-                    <a:chOff x="4813558" y="2266880"/>
-                    <a:chExt cx="2356598" cy="2241808"/>
+                    <a:off x="8832483" y="2448105"/>
+                    <a:ext cx="1908350" cy="2086313"/>
+                    <a:chOff x="4804472" y="2209919"/>
+                    <a:chExt cx="2365684" cy="2298769"/>
                   </a:xfrm>
                 </p:grpSpPr>
+                <p:sp>
+                  <p:nvSpPr>
+                    <p:cNvPr id="64" name="Text Box 11">
+                      <a:extLst>
+                        <a:ext uri="{FF2B5EF4-FFF2-40B4-BE49-F238E27FC236}">
+                          <a16:creationId xmlns:a16="http://schemas.microsoft.com/office/drawing/2014/main" id="{365119F2-1DA1-222E-972D-AC773BB3F3E7}"/>
+                        </a:ext>
+                      </a:extLst>
+                    </p:cNvPr>
+                    <p:cNvSpPr txBox="1">
+                      <a:spLocks noChangeArrowheads="1"/>
+                    </p:cNvSpPr>
+                    <p:nvPr/>
+                  </p:nvSpPr>
+                  <p:spPr bwMode="auto">
+                    <a:xfrm>
+                      <a:off x="6026779" y="4230875"/>
+                      <a:ext cx="1136650" cy="277813"/>
+                    </a:xfrm>
+                    <a:prstGeom prst="rect">
+                      <a:avLst/>
+                    </a:prstGeom>
+                    <a:solidFill>
+                      <a:srgbClr val="FFFFFF"/>
+                    </a:solidFill>
+                    <a:ln>
+                      <a:noFill/>
+                    </a:ln>
+                    <a:extLst>
+                      <a:ext uri="{91240B29-F687-4F45-9708-019B960494DF}">
+                        <a14:hiddenLine xmlns:a14="http://schemas.microsoft.com/office/drawing/2010/main" w="6350">
+                          <a:solidFill>
+                            <a:srgbClr val="000000"/>
+                          </a:solidFill>
+                          <a:miter lim="800000"/>
+                          <a:headEnd/>
+                          <a:tailEnd/>
+                        </a14:hiddenLine>
+                      </a:ext>
+                    </a:extLst>
+                  </p:spPr>
+                  <p:txBody>
+                    <a:bodyPr vert="horz" wrap="square" lIns="91440" tIns="45720" rIns="91440" bIns="45720" numCol="1" anchor="t" anchorCtr="0" compatLnSpc="1">
+                      <a:prstTxWarp prst="textNoShape">
+                        <a:avLst/>
+                      </a:prstTxWarp>
+                    </a:bodyPr>
+                    <a:lstStyle/>
+                    <a:p>
+                      <a:pPr marL="0" marR="0" lvl="0" indent="0" algn="ctr" defTabSz="914400" rtl="0" eaLnBrk="0" fontAlgn="base" latinLnBrk="0" hangingPunct="0">
+                        <a:lnSpc>
+                          <a:spcPct val="100000"/>
+                        </a:lnSpc>
+                        <a:spcBef>
+                          <a:spcPct val="0"/>
+                        </a:spcBef>
+                        <a:spcAft>
+                          <a:spcPct val="0"/>
+                        </a:spcAft>
+                        <a:buClrTx/>
+                        <a:buSzTx/>
+                        <a:buFontTx/>
+                        <a:buNone/>
+                        <a:tabLst/>
+                      </a:pPr>
+                      <a:r>
+                        <a:rPr lang="en-US" altLang="en-US" sz="1100" i="1" dirty="0">
+                          <a:latin typeface="Sylfaen" panose="010A0502050306030303" pitchFamily="18" charset="0"/>
+                          <a:cs typeface="Times New Roman" panose="02020603050405020304" pitchFamily="18" charset="0"/>
+                        </a:rPr>
+                        <a:t>Right</a:t>
+                      </a:r>
+                      <a:endParaRPr kumimoji="0" lang="en-US" altLang="en-US" sz="2400" b="0" i="0" u="none" strike="noStrike" cap="none" normalizeH="0" baseline="0" dirty="0">
+                        <a:ln>
+                          <a:noFill/>
+                        </a:ln>
+                        <a:solidFill>
+                          <a:schemeClr val="tx1"/>
+                        </a:solidFill>
+                        <a:effectLst/>
+                        <a:latin typeface="Arial" panose="020B0604020202020204" pitchFamily="34" charset="0"/>
+                      </a:endParaRPr>
+                    </a:p>
+                  </p:txBody>
+                </p:sp>
                 <p:pic>
                   <p:nvPicPr>
                     <p:cNvPr id="61" name="Graphic 60" descr="School girl outline">
@@ -8117,13 +7909,13 @@
                     <p:nvPr/>
                   </p:nvPicPr>
                   <p:blipFill>
-                    <a:blip r:embed="rId4">
+                    <a:blip r:embed="rId5">
                       <a:extLst>
                         <a:ext uri="{28A0092B-C50C-407E-A947-70E740481C1C}">
                           <a14:useLocalDpi xmlns:a14="http://schemas.microsoft.com/office/drawing/2010/main" val="0"/>
                         </a:ext>
                         <a:ext uri="{96DAC541-7B7A-43D3-8B79-37D633B846F1}">
-                          <asvg:svgBlip xmlns:asvg="http://schemas.microsoft.com/office/drawing/2016/SVG/main" r:embed="rId5"/>
+                          <asvg:svgBlip xmlns:asvg="http://schemas.microsoft.com/office/drawing/2016/SVG/main" r:embed="rId6"/>
                         </a:ext>
                       </a:extLst>
                     </a:blip>
@@ -8155,8 +7947,8 @@
                   </p:nvSpPr>
                   <p:spPr>
                     <a:xfrm>
-                      <a:off x="6011916" y="2901315"/>
-                      <a:ext cx="1158240" cy="1294801"/>
+                      <a:off x="6011915" y="2818592"/>
+                      <a:ext cx="1158241" cy="1363276"/>
                     </a:xfrm>
                     <a:prstGeom prst="roundRect">
                       <a:avLst/>
@@ -8211,7 +8003,7 @@
                   </p:nvSpPr>
                   <p:spPr>
                     <a:xfrm flipH="1">
-                      <a:off x="4813558" y="2266880"/>
+                      <a:off x="4804472" y="2209919"/>
                       <a:ext cx="1218030" cy="422956"/>
                     </a:xfrm>
                     <a:prstGeom prst="wedgeRoundRectCallout">
@@ -8332,91 +8124,6 @@
                 </p:sp>
                 <p:sp>
                   <p:nvSpPr>
-                    <p:cNvPr id="64" name="Text Box 11">
-                      <a:extLst>
-                        <a:ext uri="{FF2B5EF4-FFF2-40B4-BE49-F238E27FC236}">
-                          <a16:creationId xmlns:a16="http://schemas.microsoft.com/office/drawing/2014/main" id="{365119F2-1DA1-222E-972D-AC773BB3F3E7}"/>
-                        </a:ext>
-                      </a:extLst>
-                    </p:cNvPr>
-                    <p:cNvSpPr txBox="1">
-                      <a:spLocks noChangeArrowheads="1"/>
-                    </p:cNvSpPr>
-                    <p:nvPr/>
-                  </p:nvSpPr>
-                  <p:spPr bwMode="auto">
-                    <a:xfrm>
-                      <a:off x="6026779" y="4230875"/>
-                      <a:ext cx="1136650" cy="277813"/>
-                    </a:xfrm>
-                    <a:prstGeom prst="rect">
-                      <a:avLst/>
-                    </a:prstGeom>
-                    <a:solidFill>
-                      <a:srgbClr val="FFFFFF"/>
-                    </a:solidFill>
-                    <a:ln>
-                      <a:noFill/>
-                    </a:ln>
-                    <a:extLst>
-                      <a:ext uri="{91240B29-F687-4F45-9708-019B960494DF}">
-                        <a14:hiddenLine xmlns:a14="http://schemas.microsoft.com/office/drawing/2010/main" w="6350">
-                          <a:solidFill>
-                            <a:srgbClr val="000000"/>
-                          </a:solidFill>
-                          <a:miter lim="800000"/>
-                          <a:headEnd/>
-                          <a:tailEnd/>
-                        </a14:hiddenLine>
-                      </a:ext>
-                    </a:extLst>
-                  </p:spPr>
-                  <p:txBody>
-                    <a:bodyPr vert="horz" wrap="square" lIns="91440" tIns="45720" rIns="91440" bIns="45720" numCol="1" anchor="t" anchorCtr="0" compatLnSpc="1">
-                      <a:prstTxWarp prst="textNoShape">
-                        <a:avLst/>
-                      </a:prstTxWarp>
-                    </a:bodyPr>
-                    <a:lstStyle/>
-                    <a:p>
-                      <a:pPr marL="0" marR="0" lvl="0" indent="0" algn="ctr" defTabSz="914400" rtl="0" eaLnBrk="0" fontAlgn="base" latinLnBrk="0" hangingPunct="0">
-                        <a:lnSpc>
-                          <a:spcPct val="100000"/>
-                        </a:lnSpc>
-                        <a:spcBef>
-                          <a:spcPct val="0"/>
-                        </a:spcBef>
-                        <a:spcAft>
-                          <a:spcPct val="0"/>
-                        </a:spcAft>
-                        <a:buClrTx/>
-                        <a:buSzTx/>
-                        <a:buFontTx/>
-                        <a:buNone/>
-                        <a:tabLst/>
-                      </a:pPr>
-                      <a:r>
-                        <a:rPr lang="en-US" altLang="en-US" sz="1100" i="1" dirty="0">
-                          <a:latin typeface="Sylfaen" panose="010A0502050306030303" pitchFamily="18" charset="0"/>
-                          <a:cs typeface="Times New Roman" panose="02020603050405020304" pitchFamily="18" charset="0"/>
-                        </a:rPr>
-                        <a:t>Right</a:t>
-                      </a:r>
-                      <a:endParaRPr kumimoji="0" lang="en-US" altLang="en-US" sz="2400" b="0" i="0" u="none" strike="noStrike" cap="none" normalizeH="0" baseline="0" dirty="0">
-                        <a:ln>
-                          <a:noFill/>
-                        </a:ln>
-                        <a:solidFill>
-                          <a:schemeClr val="tx1"/>
-                        </a:solidFill>
-                        <a:effectLst/>
-                        <a:latin typeface="Arial" panose="020B0604020202020204" pitchFamily="34" charset="0"/>
-                      </a:endParaRPr>
-                    </a:p>
-                  </p:txBody>
-                </p:sp>
-                <p:sp>
-                  <p:nvSpPr>
                     <p:cNvPr id="65" name="Text Box 10">
                       <a:extLst>
                         <a:ext uri="{FF2B5EF4-FFF2-40B4-BE49-F238E27FC236}">
@@ -8431,8 +8138,8 @@
                   </p:nvSpPr>
                   <p:spPr bwMode="auto">
                     <a:xfrm>
-                      <a:off x="6026779" y="2646658"/>
-                      <a:ext cx="1136650" cy="277813"/>
+                      <a:off x="6011915" y="2533760"/>
+                      <a:ext cx="1136649" cy="277813"/>
                     </a:xfrm>
                     <a:prstGeom prst="rect">
                       <a:avLst/>
@@ -8510,13 +8217,13 @@
                   <p:nvPr/>
                 </p:nvPicPr>
                 <p:blipFill>
-                  <a:blip r:embed="rId6">
+                  <a:blip r:embed="rId7">
                     <a:extLst>
                       <a:ext uri="{28A0092B-C50C-407E-A947-70E740481C1C}">
                         <a14:useLocalDpi xmlns:a14="http://schemas.microsoft.com/office/drawing/2010/main" val="0"/>
                       </a:ext>
                       <a:ext uri="{96DAC541-7B7A-43D3-8B79-37D633B846F1}">
-                        <asvg:svgBlip xmlns:asvg="http://schemas.microsoft.com/office/drawing/2016/SVG/main" r:embed="rId7"/>
+                        <asvg:svgBlip xmlns:asvg="http://schemas.microsoft.com/office/drawing/2016/SVG/main" r:embed="rId8"/>
                       </a:ext>
                     </a:extLst>
                   </a:blip>
@@ -8526,7 +8233,7 @@
                 </p:blipFill>
                 <p:spPr>
                   <a:xfrm>
-                    <a:off x="10391163" y="3118899"/>
+                    <a:off x="10411755" y="3058907"/>
                     <a:ext cx="334952" cy="376847"/>
                   </a:xfrm>
                   <a:prstGeom prst="rect">
@@ -8549,13 +8256,13 @@
                   <p:nvPr/>
                 </p:nvPicPr>
                 <p:blipFill>
-                  <a:blip r:embed="rId8">
+                  <a:blip r:embed="rId9">
                     <a:extLst>
                       <a:ext uri="{28A0092B-C50C-407E-A947-70E740481C1C}">
                         <a14:useLocalDpi xmlns:a14="http://schemas.microsoft.com/office/drawing/2010/main" val="0"/>
                       </a:ext>
                       <a:ext uri="{96DAC541-7B7A-43D3-8B79-37D633B846F1}">
-                        <asvg:svgBlip xmlns:asvg="http://schemas.microsoft.com/office/drawing/2016/SVG/main" r:embed="rId9"/>
+                        <asvg:svgBlip xmlns:asvg="http://schemas.microsoft.com/office/drawing/2016/SVG/main" r:embed="rId10"/>
                       </a:ext>
                     </a:extLst>
                   </a:blip>
@@ -8565,7 +8272,7 @@
                 </p:blipFill>
                 <p:spPr>
                   <a:xfrm>
-                    <a:off x="10400727" y="3502139"/>
+                    <a:off x="10435715" y="3409527"/>
                     <a:ext cx="288948" cy="412616"/>
                   </a:xfrm>
                   <a:prstGeom prst="rect">
@@ -8588,10 +8295,10 @@
               </p:nvGrpSpPr>
               <p:grpSpPr>
                 <a:xfrm>
-                  <a:off x="6656276" y="2371135"/>
-                  <a:ext cx="1896150" cy="2023128"/>
-                  <a:chOff x="6573471" y="2515805"/>
-                  <a:chExt cx="1896150" cy="2023128"/>
+                  <a:off x="6656276" y="2337948"/>
+                  <a:ext cx="1890440" cy="2056314"/>
+                  <a:chOff x="6573471" y="2482618"/>
+                  <a:chExt cx="1890440" cy="2056314"/>
                 </a:xfrm>
               </p:grpSpPr>
               <p:grpSp>
@@ -8608,12 +8315,105 @@
                 </p:nvGrpSpPr>
                 <p:grpSpPr>
                   <a:xfrm>
-                    <a:off x="6573471" y="2515805"/>
-                    <a:ext cx="1896150" cy="2023128"/>
-                    <a:chOff x="2011944" y="2352041"/>
-                    <a:chExt cx="2350560" cy="2229152"/>
+                    <a:off x="6573471" y="2482618"/>
+                    <a:ext cx="1890440" cy="2056314"/>
+                    <a:chOff x="2011944" y="2315475"/>
+                    <a:chExt cx="2343481" cy="2265718"/>
                   </a:xfrm>
                 </p:grpSpPr>
+                <p:sp>
+                  <p:nvSpPr>
+                    <p:cNvPr id="69" name="Text Box 10">
+                      <a:extLst>
+                        <a:ext uri="{FF2B5EF4-FFF2-40B4-BE49-F238E27FC236}">
+                          <a16:creationId xmlns:a16="http://schemas.microsoft.com/office/drawing/2014/main" id="{590C7867-BE46-1735-1A76-348A5FDB61C2}"/>
+                        </a:ext>
+                      </a:extLst>
+                    </p:cNvPr>
+                    <p:cNvSpPr txBox="1">
+                      <a:spLocks noChangeArrowheads="1"/>
+                    </p:cNvSpPr>
+                    <p:nvPr/>
+                  </p:nvSpPr>
+                  <p:spPr bwMode="auto">
+                    <a:xfrm>
+                      <a:off x="2037935" y="4303381"/>
+                      <a:ext cx="1136650" cy="277812"/>
+                    </a:xfrm>
+                    <a:prstGeom prst="rect">
+                      <a:avLst/>
+                    </a:prstGeom>
+                    <a:solidFill>
+                      <a:srgbClr val="FFFFFF"/>
+                    </a:solidFill>
+                    <a:ln>
+                      <a:noFill/>
+                    </a:ln>
+                    <a:extLst>
+                      <a:ext uri="{91240B29-F687-4F45-9708-019B960494DF}">
+                        <a14:hiddenLine xmlns:a14="http://schemas.microsoft.com/office/drawing/2010/main" w="6350">
+                          <a:solidFill>
+                            <a:srgbClr val="000000"/>
+                          </a:solidFill>
+                          <a:miter lim="800000"/>
+                          <a:headEnd/>
+                          <a:tailEnd/>
+                        </a14:hiddenLine>
+                      </a:ext>
+                    </a:extLst>
+                  </p:spPr>
+                  <p:txBody>
+                    <a:bodyPr vert="horz" wrap="square" lIns="91440" tIns="45720" rIns="91440" bIns="45720" numCol="1" anchor="t" anchorCtr="0" compatLnSpc="1">
+                      <a:prstTxWarp prst="textNoShape">
+                        <a:avLst/>
+                      </a:prstTxWarp>
+                    </a:bodyPr>
+                    <a:lstStyle/>
+                    <a:p>
+                      <a:pPr marL="0" marR="0" lvl="0" indent="0" algn="ctr" defTabSz="914400" rtl="0" eaLnBrk="0" fontAlgn="base" latinLnBrk="0" hangingPunct="0">
+                        <a:lnSpc>
+                          <a:spcPct val="100000"/>
+                        </a:lnSpc>
+                        <a:spcBef>
+                          <a:spcPct val="0"/>
+                        </a:spcBef>
+                        <a:spcAft>
+                          <a:spcPct val="0"/>
+                        </a:spcAft>
+                        <a:buClrTx/>
+                        <a:buSzTx/>
+                        <a:buFontTx/>
+                        <a:buNone/>
+                        <a:tabLst/>
+                      </a:pPr>
+                      <a:r>
+                        <a:rPr kumimoji="0" lang="en-US" altLang="en-US" sz="1100" b="0" i="1" u="none" strike="noStrike" cap="none" normalizeH="0" baseline="0" dirty="0">
+                          <a:ln>
+                            <a:noFill/>
+                          </a:ln>
+                          <a:solidFill>
+                            <a:schemeClr val="tx1"/>
+                          </a:solidFill>
+                          <a:effectLst/>
+                          <a:latin typeface="Sylfaen" panose="010A0502050306030303" pitchFamily="18" charset="0"/>
+                          <a:ea typeface="Calibri" panose="020F0502020204030204" pitchFamily="34" charset="0"/>
+                          <a:cs typeface="Times New Roman" panose="02020603050405020304" pitchFamily="18" charset="0"/>
+                        </a:rPr>
+                        <a:t>Left</a:t>
+                      </a:r>
+                      <a:endParaRPr kumimoji="0" lang="en-US" altLang="en-US" sz="2400" b="0" i="0" u="none" strike="noStrike" cap="none" normalizeH="0" baseline="0" dirty="0">
+                        <a:ln>
+                          <a:noFill/>
+                        </a:ln>
+                        <a:solidFill>
+                          <a:schemeClr val="tx1"/>
+                        </a:solidFill>
+                        <a:effectLst/>
+                        <a:latin typeface="Arial" panose="020B0604020202020204" pitchFamily="34" charset="0"/>
+                      </a:endParaRPr>
+                    </a:p>
+                  </p:txBody>
+                </p:sp>
                 <p:pic>
                   <p:nvPicPr>
                     <p:cNvPr id="66" name="Graphic 65" descr="School boy outline">
@@ -8629,13 +8429,13 @@
                     <p:nvPr/>
                   </p:nvPicPr>
                   <p:blipFill>
-                    <a:blip r:embed="rId10">
+                    <a:blip r:embed="rId11">
                       <a:extLst>
                         <a:ext uri="{28A0092B-C50C-407E-A947-70E740481C1C}">
                           <a14:useLocalDpi xmlns:a14="http://schemas.microsoft.com/office/drawing/2010/main" val="0"/>
                         </a:ext>
                         <a:ext uri="{96DAC541-7B7A-43D3-8B79-37D633B846F1}">
-                          <asvg:svgBlip xmlns:asvg="http://schemas.microsoft.com/office/drawing/2016/SVG/main" r:embed="rId11"/>
+                          <asvg:svgBlip xmlns:asvg="http://schemas.microsoft.com/office/drawing/2016/SVG/main" r:embed="rId12"/>
                         </a:ext>
                       </a:extLst>
                     </a:blip>
@@ -8645,8 +8445,8 @@
                   </p:blipFill>
                   <p:spPr>
                     <a:xfrm>
-                      <a:off x="2427154" y="3484432"/>
-                      <a:ext cx="856384" cy="856384"/>
+                      <a:off x="2435627" y="3551804"/>
+                      <a:ext cx="856385" cy="856384"/>
                     </a:xfrm>
                     <a:prstGeom prst="rect">
                       <a:avLst/>
@@ -8667,8 +8467,8 @@
                   </p:nvSpPr>
                   <p:spPr>
                     <a:xfrm>
-                      <a:off x="2011944" y="2954020"/>
-                      <a:ext cx="1165225" cy="1294801"/>
+                      <a:off x="2011944" y="2930170"/>
+                      <a:ext cx="1165225" cy="1377524"/>
                     </a:xfrm>
                     <a:prstGeom prst="roundRect">
                       <a:avLst/>
@@ -8723,7 +8523,7 @@
                   </p:nvSpPr>
                   <p:spPr>
                     <a:xfrm>
-                      <a:off x="3139975" y="2352041"/>
+                      <a:off x="3132896" y="2315475"/>
                       <a:ext cx="1222529" cy="419210"/>
                     </a:xfrm>
                     <a:prstGeom prst="wedgeRoundRectCallout">
@@ -8842,99 +8642,6 @@
                 </p:sp>
                 <p:sp>
                   <p:nvSpPr>
-                    <p:cNvPr id="69" name="Text Box 10">
-                      <a:extLst>
-                        <a:ext uri="{FF2B5EF4-FFF2-40B4-BE49-F238E27FC236}">
-                          <a16:creationId xmlns:a16="http://schemas.microsoft.com/office/drawing/2014/main" id="{590C7867-BE46-1735-1A76-348A5FDB61C2}"/>
-                        </a:ext>
-                      </a:extLst>
-                    </p:cNvPr>
-                    <p:cNvSpPr txBox="1">
-                      <a:spLocks noChangeArrowheads="1"/>
-                    </p:cNvSpPr>
-                    <p:nvPr/>
-                  </p:nvSpPr>
-                  <p:spPr bwMode="auto">
-                    <a:xfrm>
-                      <a:off x="2037935" y="4303381"/>
-                      <a:ext cx="1136650" cy="277812"/>
-                    </a:xfrm>
-                    <a:prstGeom prst="rect">
-                      <a:avLst/>
-                    </a:prstGeom>
-                    <a:solidFill>
-                      <a:srgbClr val="FFFFFF"/>
-                    </a:solidFill>
-                    <a:ln>
-                      <a:noFill/>
-                    </a:ln>
-                    <a:extLst>
-                      <a:ext uri="{91240B29-F687-4F45-9708-019B960494DF}">
-                        <a14:hiddenLine xmlns:a14="http://schemas.microsoft.com/office/drawing/2010/main" w="6350">
-                          <a:solidFill>
-                            <a:srgbClr val="000000"/>
-                          </a:solidFill>
-                          <a:miter lim="800000"/>
-                          <a:headEnd/>
-                          <a:tailEnd/>
-                        </a14:hiddenLine>
-                      </a:ext>
-                    </a:extLst>
-                  </p:spPr>
-                  <p:txBody>
-                    <a:bodyPr vert="horz" wrap="square" lIns="91440" tIns="45720" rIns="91440" bIns="45720" numCol="1" anchor="t" anchorCtr="0" compatLnSpc="1">
-                      <a:prstTxWarp prst="textNoShape">
-                        <a:avLst/>
-                      </a:prstTxWarp>
-                    </a:bodyPr>
-                    <a:lstStyle/>
-                    <a:p>
-                      <a:pPr marL="0" marR="0" lvl="0" indent="0" algn="ctr" defTabSz="914400" rtl="0" eaLnBrk="0" fontAlgn="base" latinLnBrk="0" hangingPunct="0">
-                        <a:lnSpc>
-                          <a:spcPct val="100000"/>
-                        </a:lnSpc>
-                        <a:spcBef>
-                          <a:spcPct val="0"/>
-                        </a:spcBef>
-                        <a:spcAft>
-                          <a:spcPct val="0"/>
-                        </a:spcAft>
-                        <a:buClrTx/>
-                        <a:buSzTx/>
-                        <a:buFontTx/>
-                        <a:buNone/>
-                        <a:tabLst/>
-                      </a:pPr>
-                      <a:r>
-                        <a:rPr kumimoji="0" lang="en-US" altLang="en-US" sz="1100" b="0" i="1" u="none" strike="noStrike" cap="none" normalizeH="0" baseline="0" dirty="0">
-                          <a:ln>
-                            <a:noFill/>
-                          </a:ln>
-                          <a:solidFill>
-                            <a:schemeClr val="tx1"/>
-                          </a:solidFill>
-                          <a:effectLst/>
-                          <a:latin typeface="Sylfaen" panose="010A0502050306030303" pitchFamily="18" charset="0"/>
-                          <a:ea typeface="Calibri" panose="020F0502020204030204" pitchFamily="34" charset="0"/>
-                          <a:cs typeface="Times New Roman" panose="02020603050405020304" pitchFamily="18" charset="0"/>
-                        </a:rPr>
-                        <a:t>Left</a:t>
-                      </a:r>
-                      <a:endParaRPr kumimoji="0" lang="en-US" altLang="en-US" sz="2400" b="0" i="0" u="none" strike="noStrike" cap="none" normalizeH="0" baseline="0" dirty="0">
-                        <a:ln>
-                          <a:noFill/>
-                        </a:ln>
-                        <a:solidFill>
-                          <a:schemeClr val="tx1"/>
-                        </a:solidFill>
-                        <a:effectLst/>
-                        <a:latin typeface="Arial" panose="020B0604020202020204" pitchFamily="34" charset="0"/>
-                      </a:endParaRPr>
-                    </a:p>
-                  </p:txBody>
-                </p:sp>
-                <p:sp>
-                  <p:nvSpPr>
                     <p:cNvPr id="70" name="Text Box 10">
                       <a:extLst>
                         <a:ext uri="{FF2B5EF4-FFF2-40B4-BE49-F238E27FC236}">
@@ -8949,8 +8656,8 @@
                   </p:nvSpPr>
                   <p:spPr bwMode="auto">
                     <a:xfrm>
-                      <a:off x="2037935" y="2694838"/>
-                      <a:ext cx="1136650" cy="277813"/>
+                      <a:off x="2037935" y="2637834"/>
+                      <a:ext cx="1136650" cy="277812"/>
                     </a:xfrm>
                     <a:prstGeom prst="rect">
                       <a:avLst/>
@@ -9028,13 +8735,13 @@
                   <p:nvPr/>
                 </p:nvPicPr>
                 <p:blipFill>
-                  <a:blip r:embed="rId12">
+                  <a:blip r:embed="rId13">
                     <a:extLst>
                       <a:ext uri="{28A0092B-C50C-407E-A947-70E740481C1C}">
                         <a14:useLocalDpi xmlns:a14="http://schemas.microsoft.com/office/drawing/2010/main" val="0"/>
                       </a:ext>
                       <a:ext uri="{96DAC541-7B7A-43D3-8B79-37D633B846F1}">
-                        <asvg:svgBlip xmlns:asvg="http://schemas.microsoft.com/office/drawing/2016/SVG/main" r:embed="rId13"/>
+                        <asvg:svgBlip xmlns:asvg="http://schemas.microsoft.com/office/drawing/2016/SVG/main" r:embed="rId14"/>
                       </a:ext>
                     </a:extLst>
                   </a:blip>
@@ -9044,7 +8751,7 @@
                 </p:blipFill>
                 <p:spPr>
                   <a:xfrm>
-                    <a:off x="6621804" y="3114054"/>
+                    <a:off x="6609234" y="3081187"/>
                     <a:ext cx="366960" cy="412859"/>
                   </a:xfrm>
                   <a:prstGeom prst="rect">
@@ -9067,13 +8774,13 @@
                   <p:nvPr/>
                 </p:nvPicPr>
                 <p:blipFill>
-                  <a:blip r:embed="rId8">
+                  <a:blip r:embed="rId9">
                     <a:extLst>
                       <a:ext uri="{28A0092B-C50C-407E-A947-70E740481C1C}">
                         <a14:useLocalDpi xmlns:a14="http://schemas.microsoft.com/office/drawing/2010/main" val="0"/>
                       </a:ext>
                       <a:ext uri="{96DAC541-7B7A-43D3-8B79-37D633B846F1}">
-                        <asvg:svgBlip xmlns:asvg="http://schemas.microsoft.com/office/drawing/2016/SVG/main" r:embed="rId9"/>
+                        <asvg:svgBlip xmlns:asvg="http://schemas.microsoft.com/office/drawing/2016/SVG/main" r:embed="rId10"/>
                       </a:ext>
                     </a:extLst>
                   </a:blip>
@@ -9083,7 +8790,7 @@
                 </p:blipFill>
                 <p:spPr>
                   <a:xfrm flipH="1">
-                    <a:off x="6607694" y="3466946"/>
+                    <a:off x="6618653" y="3433435"/>
                     <a:ext cx="288948" cy="412616"/>
                   </a:xfrm>
                   <a:prstGeom prst="rect">
@@ -9200,7 +8907,7 @@
           </p:nvSpPr>
           <p:spPr>
             <a:xfrm>
-              <a:off x="5894322" y="3315186"/>
+              <a:off x="5876206" y="3277468"/>
               <a:ext cx="506132" cy="369332"/>
             </a:xfrm>
             <a:prstGeom prst="rect">
@@ -9235,7 +8942,7 @@
           </p:nvSpPr>
           <p:spPr>
             <a:xfrm>
-              <a:off x="9381902" y="3378211"/>
+              <a:off x="9397177" y="3282218"/>
               <a:ext cx="417980" cy="369332"/>
             </a:xfrm>
             <a:prstGeom prst="rect">
@@ -9271,7 +8978,7 @@
         </p:nvGrpSpPr>
         <p:grpSpPr>
           <a:xfrm>
-            <a:off x="4866745" y="3393302"/>
+            <a:off x="4503678" y="3596638"/>
             <a:ext cx="4094808" cy="2141269"/>
             <a:chOff x="333568" y="1626628"/>
             <a:chExt cx="4251686" cy="2272510"/>
@@ -9349,10 +9056,10 @@
             </p:nvGrpSpPr>
             <p:grpSpPr>
               <a:xfrm>
-                <a:off x="576709" y="2637234"/>
-                <a:ext cx="3815138" cy="1691071"/>
-                <a:chOff x="6656274" y="2674039"/>
-                <a:chExt cx="4094760" cy="1691071"/>
+                <a:off x="564862" y="2637235"/>
+                <a:ext cx="3824551" cy="1787392"/>
+                <a:chOff x="6643560" y="2674040"/>
+                <a:chExt cx="4104863" cy="1787392"/>
               </a:xfrm>
             </p:grpSpPr>
             <p:grpSp>
@@ -9390,13 +9097,13 @@
                   <p:nvPr/>
                 </p:nvPicPr>
                 <p:blipFill>
-                  <a:blip r:embed="rId2">
+                  <a:blip r:embed="rId3">
                     <a:extLst>
                       <a:ext uri="{28A0092B-C50C-407E-A947-70E740481C1C}">
                         <a14:useLocalDpi xmlns:a14="http://schemas.microsoft.com/office/drawing/2010/main" val="0"/>
                       </a:ext>
                       <a:ext uri="{96DAC541-7B7A-43D3-8B79-37D633B846F1}">
-                        <asvg:svgBlip xmlns:asvg="http://schemas.microsoft.com/office/drawing/2016/SVG/main" r:embed="rId3"/>
+                        <asvg:svgBlip xmlns:asvg="http://schemas.microsoft.com/office/drawing/2016/SVG/main" r:embed="rId4"/>
                       </a:ext>
                     </a:extLst>
                   </a:blip>
@@ -9610,10 +9317,10 @@
               </p:nvGrpSpPr>
               <p:grpSpPr>
                 <a:xfrm>
-                  <a:off x="9734711" y="2719608"/>
-                  <a:ext cx="1016323" cy="1359271"/>
-                  <a:chOff x="9745448" y="2834392"/>
-                  <a:chExt cx="1016323" cy="1359271"/>
+                  <a:off x="9735249" y="2719607"/>
+                  <a:ext cx="1013174" cy="1737848"/>
+                  <a:chOff x="9745986" y="2834391"/>
+                  <a:chExt cx="1013174" cy="1737848"/>
                 </a:xfrm>
               </p:grpSpPr>
               <p:grpSp>
@@ -9630,107 +9337,12 @@
                 </p:nvGrpSpPr>
                 <p:grpSpPr>
                   <a:xfrm>
-                    <a:off x="9745448" y="2834392"/>
-                    <a:ext cx="1016323" cy="1359271"/>
-                    <a:chOff x="5936225" y="2635547"/>
-                    <a:chExt cx="1259883" cy="1497692"/>
+                    <a:off x="9745986" y="2834391"/>
+                    <a:ext cx="1013174" cy="1737848"/>
+                    <a:chOff x="5936890" y="2635547"/>
+                    <a:chExt cx="1255979" cy="1914821"/>
                   </a:xfrm>
                 </p:grpSpPr>
-                <p:pic>
-                  <p:nvPicPr>
-                    <p:cNvPr id="151" name="Graphic 150" descr="School girl outline">
-                      <a:extLst>
-                        <a:ext uri="{FF2B5EF4-FFF2-40B4-BE49-F238E27FC236}">
-                          <a16:creationId xmlns:a16="http://schemas.microsoft.com/office/drawing/2014/main" id="{E61AB27B-E561-B4FF-0E65-CFDD864EAD20}"/>
-                        </a:ext>
-                      </a:extLst>
-                    </p:cNvPr>
-                    <p:cNvPicPr>
-                      <a:picLocks noChangeAspect="1"/>
-                    </p:cNvPicPr>
-                    <p:nvPr/>
-                  </p:nvPicPr>
-                  <p:blipFill>
-                    <a:blip r:embed="rId4">
-                      <a:extLst>
-                        <a:ext uri="{28A0092B-C50C-407E-A947-70E740481C1C}">
-                          <a14:useLocalDpi xmlns:a14="http://schemas.microsoft.com/office/drawing/2010/main" val="0"/>
-                        </a:ext>
-                        <a:ext uri="{96DAC541-7B7A-43D3-8B79-37D633B846F1}">
-                          <asvg:svgBlip xmlns:asvg="http://schemas.microsoft.com/office/drawing/2016/SVG/main" r:embed="rId5"/>
-                        </a:ext>
-                      </a:extLst>
-                    </a:blip>
-                    <a:stretch>
-                      <a:fillRect/>
-                    </a:stretch>
-                  </p:blipFill>
-                  <p:spPr>
-                    <a:xfrm>
-                      <a:off x="5936225" y="3064600"/>
-                      <a:ext cx="856384" cy="856384"/>
-                    </a:xfrm>
-                    <a:prstGeom prst="rect">
-                      <a:avLst/>
-                    </a:prstGeom>
-                  </p:spPr>
-                </p:pic>
-                <p:sp>
-                  <p:nvSpPr>
-                    <p:cNvPr id="152" name="Rectangle: Rounded Corners 151">
-                      <a:extLst>
-                        <a:ext uri="{FF2B5EF4-FFF2-40B4-BE49-F238E27FC236}">
-                          <a16:creationId xmlns:a16="http://schemas.microsoft.com/office/drawing/2014/main" id="{8A7D3F2F-3A64-1A01-2121-26EECE3FAFAF}"/>
-                        </a:ext>
-                      </a:extLst>
-                    </p:cNvPr>
-                    <p:cNvSpPr/>
-                    <p:nvPr/>
-                  </p:nvSpPr>
-                  <p:spPr>
-                    <a:xfrm>
-                      <a:off x="6011917" y="2901315"/>
-                      <a:ext cx="1158240" cy="901700"/>
-                    </a:xfrm>
-                    <a:prstGeom prst="roundRect">
-                      <a:avLst/>
-                    </a:prstGeom>
-                    <a:noFill/>
-                    <a:ln w="57150">
-                      <a:solidFill>
-                        <a:srgbClr val="77CEF9"/>
-                      </a:solidFill>
-                    </a:ln>
-                  </p:spPr>
-                  <p:style>
-                    <a:lnRef idx="2">
-                      <a:schemeClr val="accent1">
-                        <a:shade val="50000"/>
-                      </a:schemeClr>
-                    </a:lnRef>
-                    <a:fillRef idx="1">
-                      <a:schemeClr val="accent1"/>
-                    </a:fillRef>
-                    <a:effectRef idx="0">
-                      <a:schemeClr val="accent1"/>
-                    </a:effectRef>
-                    <a:fontRef idx="minor">
-                      <a:schemeClr val="lt1"/>
-                    </a:fontRef>
-                  </p:style>
-                  <p:txBody>
-                    <a:bodyPr rot="0" spcFirstLastPara="0" vert="horz" wrap="square" lIns="91440" tIns="45720" rIns="91440" bIns="45720" numCol="1" spcCol="0" rtlCol="0" fromWordArt="0" anchor="ctr" anchorCtr="0" forceAA="0" compatLnSpc="1">
-                      <a:prstTxWarp prst="textNoShape">
-                        <a:avLst/>
-                      </a:prstTxWarp>
-                      <a:noAutofit/>
-                    </a:bodyPr>
-                    <a:lstStyle/>
-                    <a:p>
-                      <a:endParaRPr lang="en-US"/>
-                    </a:p>
-                  </p:txBody>
-                </p:sp>
                 <p:sp>
                   <p:nvSpPr>
                     <p:cNvPr id="154" name="Text Box 11">
@@ -9747,8 +9359,8 @@
                   </p:nvSpPr>
                   <p:spPr bwMode="auto">
                     <a:xfrm>
-                      <a:off x="6059458" y="3855426"/>
-                      <a:ext cx="1136650" cy="277813"/>
+                      <a:off x="6050656" y="4272554"/>
+                      <a:ext cx="1136650" cy="277814"/>
                     </a:xfrm>
                     <a:prstGeom prst="rect">
                       <a:avLst/>
@@ -9821,6 +9433,101 @@
                         <a:effectLst/>
                         <a:latin typeface="Arial" panose="020B0604020202020204" pitchFamily="34" charset="0"/>
                       </a:endParaRPr>
+                    </a:p>
+                  </p:txBody>
+                </p:sp>
+                <p:pic>
+                  <p:nvPicPr>
+                    <p:cNvPr id="151" name="Graphic 150" descr="School girl outline">
+                      <a:extLst>
+                        <a:ext uri="{FF2B5EF4-FFF2-40B4-BE49-F238E27FC236}">
+                          <a16:creationId xmlns:a16="http://schemas.microsoft.com/office/drawing/2014/main" id="{E61AB27B-E561-B4FF-0E65-CFDD864EAD20}"/>
+                        </a:ext>
+                      </a:extLst>
+                    </p:cNvPr>
+                    <p:cNvPicPr>
+                      <a:picLocks noChangeAspect="1"/>
+                    </p:cNvPicPr>
+                    <p:nvPr/>
+                  </p:nvPicPr>
+                  <p:blipFill>
+                    <a:blip r:embed="rId5">
+                      <a:extLst>
+                        <a:ext uri="{28A0092B-C50C-407E-A947-70E740481C1C}">
+                          <a14:useLocalDpi xmlns:a14="http://schemas.microsoft.com/office/drawing/2010/main" val="0"/>
+                        </a:ext>
+                        <a:ext uri="{96DAC541-7B7A-43D3-8B79-37D633B846F1}">
+                          <asvg:svgBlip xmlns:asvg="http://schemas.microsoft.com/office/drawing/2016/SVG/main" r:embed="rId6"/>
+                        </a:ext>
+                      </a:extLst>
+                    </a:blip>
+                    <a:stretch>
+                      <a:fillRect/>
+                    </a:stretch>
+                  </p:blipFill>
+                  <p:spPr>
+                    <a:xfrm>
+                      <a:off x="5936890" y="3499967"/>
+                      <a:ext cx="856383" cy="856384"/>
+                    </a:xfrm>
+                    <a:prstGeom prst="rect">
+                      <a:avLst/>
+                    </a:prstGeom>
+                  </p:spPr>
+                </p:pic>
+                <p:sp>
+                  <p:nvSpPr>
+                    <p:cNvPr id="152" name="Rectangle: Rounded Corners 151">
+                      <a:extLst>
+                        <a:ext uri="{FF2B5EF4-FFF2-40B4-BE49-F238E27FC236}">
+                          <a16:creationId xmlns:a16="http://schemas.microsoft.com/office/drawing/2014/main" id="{8A7D3F2F-3A64-1A01-2121-26EECE3FAFAF}"/>
+                        </a:ext>
+                      </a:extLst>
+                    </p:cNvPr>
+                    <p:cNvSpPr/>
+                    <p:nvPr/>
+                  </p:nvSpPr>
+                  <p:spPr>
+                    <a:xfrm>
+                      <a:off x="6011918" y="2901314"/>
+                      <a:ext cx="1158240" cy="1371240"/>
+                    </a:xfrm>
+                    <a:prstGeom prst="roundRect">
+                      <a:avLst/>
+                    </a:prstGeom>
+                    <a:noFill/>
+                    <a:ln w="57150">
+                      <a:solidFill>
+                        <a:srgbClr val="77CEF9"/>
+                      </a:solidFill>
+                    </a:ln>
+                  </p:spPr>
+                  <p:style>
+                    <a:lnRef idx="2">
+                      <a:schemeClr val="accent1">
+                        <a:shade val="50000"/>
+                      </a:schemeClr>
+                    </a:lnRef>
+                    <a:fillRef idx="1">
+                      <a:schemeClr val="accent1"/>
+                    </a:fillRef>
+                    <a:effectRef idx="0">
+                      <a:schemeClr val="accent1"/>
+                    </a:effectRef>
+                    <a:fontRef idx="minor">
+                      <a:schemeClr val="lt1"/>
+                    </a:fontRef>
+                  </p:style>
+                  <p:txBody>
+                    <a:bodyPr rot="0" spcFirstLastPara="0" vert="horz" wrap="square" lIns="91440" tIns="45720" rIns="91440" bIns="45720" numCol="1" spcCol="0" rtlCol="0" fromWordArt="0" anchor="ctr" anchorCtr="0" forceAA="0" compatLnSpc="1">
+                      <a:prstTxWarp prst="textNoShape">
+                        <a:avLst/>
+                      </a:prstTxWarp>
+                      <a:noAutofit/>
+                    </a:bodyPr>
+                    <a:lstStyle/>
+                    <a:p>
+                      <a:endParaRPr lang="en-US"/>
                     </a:p>
                   </p:txBody>
                 </p:sp>
@@ -9919,13 +9626,13 @@
                   <p:nvPr/>
                 </p:nvPicPr>
                 <p:blipFill>
-                  <a:blip r:embed="rId6">
+                  <a:blip r:embed="rId7">
                     <a:extLst>
                       <a:ext uri="{28A0092B-C50C-407E-A947-70E740481C1C}">
                         <a14:useLocalDpi xmlns:a14="http://schemas.microsoft.com/office/drawing/2010/main" val="0"/>
                       </a:ext>
                       <a:ext uri="{96DAC541-7B7A-43D3-8B79-37D633B846F1}">
-                        <asvg:svgBlip xmlns:asvg="http://schemas.microsoft.com/office/drawing/2016/SVG/main" r:embed="rId7"/>
+                        <asvg:svgBlip xmlns:asvg="http://schemas.microsoft.com/office/drawing/2016/SVG/main" r:embed="rId8"/>
                       </a:ext>
                     </a:extLst>
                   </a:blip>
@@ -9958,13 +9665,13 @@
                   <p:nvPr/>
                 </p:nvPicPr>
                 <p:blipFill>
-                  <a:blip r:embed="rId8">
+                  <a:blip r:embed="rId9">
                     <a:extLst>
                       <a:ext uri="{28A0092B-C50C-407E-A947-70E740481C1C}">
                         <a14:useLocalDpi xmlns:a14="http://schemas.microsoft.com/office/drawing/2010/main" val="0"/>
                       </a:ext>
                       <a:ext uri="{96DAC541-7B7A-43D3-8B79-37D633B846F1}">
-                        <asvg:svgBlip xmlns:asvg="http://schemas.microsoft.com/office/drawing/2016/SVG/main" r:embed="rId9"/>
+                        <asvg:svgBlip xmlns:asvg="http://schemas.microsoft.com/office/drawing/2016/SVG/main" r:embed="rId10"/>
                       </a:ext>
                     </a:extLst>
                   </a:blip>
@@ -9974,7 +9681,7 @@
                 </p:blipFill>
                 <p:spPr>
                   <a:xfrm>
-                    <a:off x="10398711" y="3482889"/>
+                    <a:off x="10427091" y="3479712"/>
                     <a:ext cx="288949" cy="412616"/>
                   </a:xfrm>
                   <a:prstGeom prst="rect">
@@ -9997,10 +9704,10 @@
               </p:nvGrpSpPr>
               <p:grpSpPr>
                 <a:xfrm>
-                  <a:off x="6656274" y="2674039"/>
-                  <a:ext cx="1046377" cy="1341743"/>
-                  <a:chOff x="6573469" y="2818709"/>
-                  <a:chExt cx="1046377" cy="1341743"/>
+                  <a:off x="6643560" y="2674040"/>
+                  <a:ext cx="1059329" cy="1787392"/>
+                  <a:chOff x="6560755" y="2818710"/>
+                  <a:chExt cx="1059329" cy="1787392"/>
                 </a:xfrm>
               </p:grpSpPr>
               <p:grpSp>
@@ -10017,107 +9724,12 @@
                 </p:nvGrpSpPr>
                 <p:grpSpPr>
                   <a:xfrm>
-                    <a:off x="6573469" y="2818709"/>
-                    <a:ext cx="1046377" cy="1341743"/>
-                    <a:chOff x="2011943" y="2685791"/>
-                    <a:chExt cx="1297140" cy="1478379"/>
+                    <a:off x="6560755" y="2818710"/>
+                    <a:ext cx="1059329" cy="1787392"/>
+                    <a:chOff x="1996183" y="2685791"/>
+                    <a:chExt cx="1313196" cy="1969410"/>
                   </a:xfrm>
                 </p:grpSpPr>
-                <p:pic>
-                  <p:nvPicPr>
-                    <p:cNvPr id="143" name="Graphic 142" descr="School boy outline">
-                      <a:extLst>
-                        <a:ext uri="{FF2B5EF4-FFF2-40B4-BE49-F238E27FC236}">
-                          <a16:creationId xmlns:a16="http://schemas.microsoft.com/office/drawing/2014/main" id="{9F99F9D3-956A-CE11-9960-EF69871F34B4}"/>
-                        </a:ext>
-                      </a:extLst>
-                    </p:cNvPr>
-                    <p:cNvPicPr>
-                      <a:picLocks noChangeAspect="1"/>
-                    </p:cNvPicPr>
-                    <p:nvPr/>
-                  </p:nvPicPr>
-                  <p:blipFill>
-                    <a:blip r:embed="rId10">
-                      <a:extLst>
-                        <a:ext uri="{28A0092B-C50C-407E-A947-70E740481C1C}">
-                          <a14:useLocalDpi xmlns:a14="http://schemas.microsoft.com/office/drawing/2010/main" val="0"/>
-                        </a:ext>
-                        <a:ext uri="{96DAC541-7B7A-43D3-8B79-37D633B846F1}">
-                          <asvg:svgBlip xmlns:asvg="http://schemas.microsoft.com/office/drawing/2016/SVG/main" r:embed="rId11"/>
-                        </a:ext>
-                      </a:extLst>
-                    </a:blip>
-                    <a:stretch>
-                      <a:fillRect/>
-                    </a:stretch>
-                  </p:blipFill>
-                  <p:spPr>
-                    <a:xfrm>
-                      <a:off x="2452699" y="3111545"/>
-                      <a:ext cx="856384" cy="856384"/>
-                    </a:xfrm>
-                    <a:prstGeom prst="rect">
-                      <a:avLst/>
-                    </a:prstGeom>
-                  </p:spPr>
-                </p:pic>
-                <p:sp>
-                  <p:nvSpPr>
-                    <p:cNvPr id="144" name="Rectangle: Rounded Corners 143">
-                      <a:extLst>
-                        <a:ext uri="{FF2B5EF4-FFF2-40B4-BE49-F238E27FC236}">
-                          <a16:creationId xmlns:a16="http://schemas.microsoft.com/office/drawing/2014/main" id="{54F561B7-D73F-E1F7-12B1-9302E74299BA}"/>
-                        </a:ext>
-                      </a:extLst>
-                    </p:cNvPr>
-                    <p:cNvSpPr/>
-                    <p:nvPr/>
-                  </p:nvSpPr>
-                  <p:spPr>
-                    <a:xfrm>
-                      <a:off x="2011944" y="2954020"/>
-                      <a:ext cx="1165225" cy="901700"/>
-                    </a:xfrm>
-                    <a:prstGeom prst="roundRect">
-                      <a:avLst/>
-                    </a:prstGeom>
-                    <a:noFill/>
-                    <a:ln w="57150">
-                      <a:solidFill>
-                        <a:srgbClr val="FFBE5F"/>
-                      </a:solidFill>
-                    </a:ln>
-                  </p:spPr>
-                  <p:style>
-                    <a:lnRef idx="2">
-                      <a:schemeClr val="accent1">
-                        <a:shade val="50000"/>
-                      </a:schemeClr>
-                    </a:lnRef>
-                    <a:fillRef idx="1">
-                      <a:schemeClr val="accent1"/>
-                    </a:fillRef>
-                    <a:effectRef idx="0">
-                      <a:schemeClr val="accent1"/>
-                    </a:effectRef>
-                    <a:fontRef idx="minor">
-                      <a:schemeClr val="lt1"/>
-                    </a:fontRef>
-                  </p:style>
-                  <p:txBody>
-                    <a:bodyPr rot="0" spcFirstLastPara="0" vert="horz" wrap="square" lIns="91440" tIns="45720" rIns="91440" bIns="45720" numCol="1" spcCol="0" rtlCol="0" fromWordArt="0" anchor="ctr" anchorCtr="0" forceAA="0" compatLnSpc="1">
-                      <a:prstTxWarp prst="textNoShape">
-                        <a:avLst/>
-                      </a:prstTxWarp>
-                      <a:noAutofit/>
-                    </a:bodyPr>
-                    <a:lstStyle/>
-                    <a:p>
-                      <a:endParaRPr lang="en-US"/>
-                    </a:p>
-                  </p:txBody>
-                </p:sp>
                 <p:sp>
                   <p:nvSpPr>
                     <p:cNvPr id="146" name="Text Box 10">
@@ -10134,8 +9746,8 @@
                   </p:nvSpPr>
                   <p:spPr bwMode="auto">
                     <a:xfrm>
-                      <a:off x="2011944" y="3886357"/>
-                      <a:ext cx="1136650" cy="277813"/>
+                      <a:off x="1996183" y="4377389"/>
+                      <a:ext cx="1136649" cy="277812"/>
                     </a:xfrm>
                     <a:prstGeom prst="rect">
                       <a:avLst/>
@@ -10200,6 +9812,101 @@
                         <a:effectLst/>
                         <a:latin typeface="Arial" panose="020B0604020202020204" pitchFamily="34" charset="0"/>
                       </a:endParaRPr>
+                    </a:p>
+                  </p:txBody>
+                </p:sp>
+                <p:pic>
+                  <p:nvPicPr>
+                    <p:cNvPr id="143" name="Graphic 142" descr="School boy outline">
+                      <a:extLst>
+                        <a:ext uri="{FF2B5EF4-FFF2-40B4-BE49-F238E27FC236}">
+                          <a16:creationId xmlns:a16="http://schemas.microsoft.com/office/drawing/2014/main" id="{9F99F9D3-956A-CE11-9960-EF69871F34B4}"/>
+                        </a:ext>
+                      </a:extLst>
+                    </p:cNvPr>
+                    <p:cNvPicPr>
+                      <a:picLocks noChangeAspect="1"/>
+                    </p:cNvPicPr>
+                    <p:nvPr/>
+                  </p:nvPicPr>
+                  <p:blipFill>
+                    <a:blip r:embed="rId11">
+                      <a:extLst>
+                        <a:ext uri="{28A0092B-C50C-407E-A947-70E740481C1C}">
+                          <a14:useLocalDpi xmlns:a14="http://schemas.microsoft.com/office/drawing/2010/main" val="0"/>
+                        </a:ext>
+                        <a:ext uri="{96DAC541-7B7A-43D3-8B79-37D633B846F1}">
+                          <asvg:svgBlip xmlns:asvg="http://schemas.microsoft.com/office/drawing/2016/SVG/main" r:embed="rId12"/>
+                        </a:ext>
+                      </a:extLst>
+                    </a:blip>
+                    <a:stretch>
+                      <a:fillRect/>
+                    </a:stretch>
+                  </p:blipFill>
+                  <p:spPr>
+                    <a:xfrm>
+                      <a:off x="2452995" y="3611209"/>
+                      <a:ext cx="856384" cy="856384"/>
+                    </a:xfrm>
+                    <a:prstGeom prst="rect">
+                      <a:avLst/>
+                    </a:prstGeom>
+                  </p:spPr>
+                </p:pic>
+                <p:sp>
+                  <p:nvSpPr>
+                    <p:cNvPr id="144" name="Rectangle: Rounded Corners 143">
+                      <a:extLst>
+                        <a:ext uri="{FF2B5EF4-FFF2-40B4-BE49-F238E27FC236}">
+                          <a16:creationId xmlns:a16="http://schemas.microsoft.com/office/drawing/2014/main" id="{54F561B7-D73F-E1F7-12B1-9302E74299BA}"/>
+                        </a:ext>
+                      </a:extLst>
+                    </p:cNvPr>
+                    <p:cNvSpPr/>
+                    <p:nvPr/>
+                  </p:nvSpPr>
+                  <p:spPr>
+                    <a:xfrm>
+                      <a:off x="2011944" y="2954019"/>
+                      <a:ext cx="1165225" cy="1418985"/>
+                    </a:xfrm>
+                    <a:prstGeom prst="roundRect">
+                      <a:avLst/>
+                    </a:prstGeom>
+                    <a:noFill/>
+                    <a:ln w="57150">
+                      <a:solidFill>
+                        <a:srgbClr val="FFBE5F"/>
+                      </a:solidFill>
+                    </a:ln>
+                  </p:spPr>
+                  <p:style>
+                    <a:lnRef idx="2">
+                      <a:schemeClr val="accent1">
+                        <a:shade val="50000"/>
+                      </a:schemeClr>
+                    </a:lnRef>
+                    <a:fillRef idx="1">
+                      <a:schemeClr val="accent1"/>
+                    </a:fillRef>
+                    <a:effectRef idx="0">
+                      <a:schemeClr val="accent1"/>
+                    </a:effectRef>
+                    <a:fontRef idx="minor">
+                      <a:schemeClr val="lt1"/>
+                    </a:fontRef>
+                  </p:style>
+                  <p:txBody>
+                    <a:bodyPr rot="0" spcFirstLastPara="0" vert="horz" wrap="square" lIns="91440" tIns="45720" rIns="91440" bIns="45720" numCol="1" spcCol="0" rtlCol="0" fromWordArt="0" anchor="ctr" anchorCtr="0" forceAA="0" compatLnSpc="1">
+                      <a:prstTxWarp prst="textNoShape">
+                        <a:avLst/>
+                      </a:prstTxWarp>
+                      <a:noAutofit/>
+                    </a:bodyPr>
+                    <a:lstStyle/>
+                    <a:p>
+                      <a:endParaRPr lang="en-US"/>
                     </a:p>
                   </p:txBody>
                 </p:sp>
@@ -10298,13 +10005,13 @@
                   <p:nvPr/>
                 </p:nvPicPr>
                 <p:blipFill>
-                  <a:blip r:embed="rId12">
+                  <a:blip r:embed="rId13">
                     <a:extLst>
                       <a:ext uri="{28A0092B-C50C-407E-A947-70E740481C1C}">
                         <a14:useLocalDpi xmlns:a14="http://schemas.microsoft.com/office/drawing/2010/main" val="0"/>
                       </a:ext>
                       <a:ext uri="{96DAC541-7B7A-43D3-8B79-37D633B846F1}">
-                        <asvg:svgBlip xmlns:asvg="http://schemas.microsoft.com/office/drawing/2016/SVG/main" r:embed="rId13"/>
+                        <asvg:svgBlip xmlns:asvg="http://schemas.microsoft.com/office/drawing/2016/SVG/main" r:embed="rId14"/>
                       </a:ext>
                     </a:extLst>
                   </a:blip>
@@ -10337,13 +10044,13 @@
                   <p:nvPr/>
                 </p:nvPicPr>
                 <p:blipFill>
-                  <a:blip r:embed="rId8">
+                  <a:blip r:embed="rId9">
                     <a:extLst>
                       <a:ext uri="{28A0092B-C50C-407E-A947-70E740481C1C}">
                         <a14:useLocalDpi xmlns:a14="http://schemas.microsoft.com/office/drawing/2010/main" val="0"/>
                       </a:ext>
                       <a:ext uri="{96DAC541-7B7A-43D3-8B79-37D633B846F1}">
-                        <asvg:svgBlip xmlns:asvg="http://schemas.microsoft.com/office/drawing/2016/SVG/main" r:embed="rId9"/>
+                        <asvg:svgBlip xmlns:asvg="http://schemas.microsoft.com/office/drawing/2016/SVG/main" r:embed="rId10"/>
                       </a:ext>
                     </a:extLst>
                   </a:blip>
@@ -10623,6 +10330,76 @@
           </p:txBody>
         </p:sp>
       </p:grpSp>
+      <p:sp>
+        <p:nvSpPr>
+          <p:cNvPr id="4" name="TextBox 3">
+            <a:extLst>
+              <a:ext uri="{FF2B5EF4-FFF2-40B4-BE49-F238E27FC236}">
+                <a16:creationId xmlns:a16="http://schemas.microsoft.com/office/drawing/2014/main" id="{0F44C982-D525-5D8B-A6B3-C9133A602053}"/>
+              </a:ext>
+            </a:extLst>
+          </p:cNvPr>
+          <p:cNvSpPr txBox="1"/>
+          <p:nvPr/>
+        </p:nvSpPr>
+        <p:spPr>
+          <a:xfrm>
+            <a:off x="7979847" y="5064006"/>
+            <a:ext cx="487457" cy="369332"/>
+          </a:xfrm>
+          <a:prstGeom prst="rect">
+            <a:avLst/>
+          </a:prstGeom>
+          <a:noFill/>
+        </p:spPr>
+        <p:txBody>
+          <a:bodyPr wrap="square" rtlCol="0">
+            <a:spAutoFit/>
+          </a:bodyPr>
+          <a:lstStyle/>
+          <a:p>
+            <a:r>
+              <a:rPr lang="en-US" dirty="0"/>
+              <a:t>W</a:t>
+            </a:r>
+          </a:p>
+        </p:txBody>
+      </p:sp>
+      <p:sp>
+        <p:nvSpPr>
+          <p:cNvPr id="5" name="TextBox 4">
+            <a:extLst>
+              <a:ext uri="{FF2B5EF4-FFF2-40B4-BE49-F238E27FC236}">
+                <a16:creationId xmlns:a16="http://schemas.microsoft.com/office/drawing/2014/main" id="{82A98C51-8D9F-EDA8-BB98-016F071EC734}"/>
+              </a:ext>
+            </a:extLst>
+          </p:cNvPr>
+          <p:cNvSpPr txBox="1"/>
+          <p:nvPr/>
+        </p:nvSpPr>
+        <p:spPr>
+          <a:xfrm>
+            <a:off x="4686185" y="5064006"/>
+            <a:ext cx="487457" cy="369332"/>
+          </a:xfrm>
+          <a:prstGeom prst="rect">
+            <a:avLst/>
+          </a:prstGeom>
+          <a:noFill/>
+        </p:spPr>
+        <p:txBody>
+          <a:bodyPr wrap="square" rtlCol="0">
+            <a:spAutoFit/>
+          </a:bodyPr>
+          <a:lstStyle/>
+          <a:p>
+            <a:r>
+              <a:rPr lang="en-US" dirty="0"/>
+              <a:t>N</a:t>
+            </a:r>
+          </a:p>
+        </p:txBody>
+      </p:sp>
     </p:spTree>
     <p:extLst>
       <p:ext uri="{BB962C8B-B14F-4D97-AF65-F5344CB8AC3E}">
@@ -10748,7 +10525,7 @@
         </p:nvSpPr>
         <p:spPr bwMode="auto">
           <a:xfrm>
-            <a:off x="6000560" y="224514"/>
+            <a:off x="5924712" y="264211"/>
             <a:ext cx="1182249" cy="350686"/>
           </a:xfrm>
           <a:prstGeom prst="rect">
@@ -10827,7 +10604,7 @@
         </p:nvSpPr>
         <p:spPr bwMode="auto">
           <a:xfrm>
-            <a:off x="6144979" y="3188010"/>
+            <a:off x="6040713" y="3211797"/>
             <a:ext cx="854301" cy="236248"/>
           </a:xfrm>
           <a:prstGeom prst="rect">
@@ -10965,7 +10742,7 @@
         </p:nvSpPr>
         <p:spPr bwMode="auto">
           <a:xfrm>
-            <a:off x="4205168" y="193209"/>
+            <a:off x="4305558" y="209941"/>
             <a:ext cx="1467665" cy="419705"/>
           </a:xfrm>
           <a:prstGeom prst="rect">
@@ -11044,7 +10821,7 @@
         </p:nvSpPr>
         <p:spPr bwMode="auto">
           <a:xfrm>
-            <a:off x="7026289" y="241040"/>
+            <a:off x="6922023" y="264827"/>
             <a:ext cx="1467665" cy="419705"/>
           </a:xfrm>
           <a:prstGeom prst="rect">
@@ -11123,7 +10900,7 @@
         </p:nvSpPr>
         <p:spPr bwMode="auto">
           <a:xfrm>
-            <a:off x="3203873" y="183841"/>
+            <a:off x="3272014" y="200037"/>
             <a:ext cx="1182249" cy="350686"/>
           </a:xfrm>
           <a:prstGeom prst="rect">
@@ -12444,99 +12221,6 @@
           </p:txBody>
         </p:sp>
       </p:grpSp>
-      <p:sp>
-        <p:nvSpPr>
-          <p:cNvPr id="45" name="Text Box 10">
-            <a:extLst>
-              <a:ext uri="{FF2B5EF4-FFF2-40B4-BE49-F238E27FC236}">
-                <a16:creationId xmlns:a16="http://schemas.microsoft.com/office/drawing/2014/main" id="{A3BFFAF1-68F8-D749-AD1A-DA8E28EC4C65}"/>
-              </a:ext>
-            </a:extLst>
-          </p:cNvPr>
-          <p:cNvSpPr txBox="1">
-            <a:spLocks noChangeArrowheads="1"/>
-          </p:cNvSpPr>
-          <p:nvPr/>
-        </p:nvSpPr>
-        <p:spPr bwMode="auto">
-          <a:xfrm>
-            <a:off x="7341770" y="3182654"/>
-            <a:ext cx="854299" cy="236247"/>
-          </a:xfrm>
-          <a:prstGeom prst="rect">
-            <a:avLst/>
-          </a:prstGeom>
-          <a:solidFill>
-            <a:srgbClr val="FFFFFF"/>
-          </a:solidFill>
-          <a:ln>
-            <a:noFill/>
-          </a:ln>
-          <a:extLst>
-            <a:ext uri="{91240B29-F687-4F45-9708-019B960494DF}">
-              <a14:hiddenLine xmlns:a14="http://schemas.microsoft.com/office/drawing/2010/main" w="6350">
-                <a:solidFill>
-                  <a:srgbClr val="000000"/>
-                </a:solidFill>
-                <a:miter lim="800000"/>
-                <a:headEnd/>
-                <a:tailEnd/>
-              </a14:hiddenLine>
-            </a:ext>
-          </a:extLst>
-        </p:spPr>
-        <p:txBody>
-          <a:bodyPr vert="horz" wrap="square" lIns="91440" tIns="45720" rIns="91440" bIns="45720" numCol="1" anchor="t" anchorCtr="0" compatLnSpc="1">
-            <a:prstTxWarp prst="textNoShape">
-              <a:avLst/>
-            </a:prstTxWarp>
-          </a:bodyPr>
-          <a:lstStyle/>
-          <a:p>
-            <a:pPr marL="0" marR="0" lvl="0" indent="0" algn="ctr" defTabSz="914400" rtl="0" eaLnBrk="0" fontAlgn="base" latinLnBrk="0" hangingPunct="0">
-              <a:lnSpc>
-                <a:spcPct val="100000"/>
-              </a:lnSpc>
-              <a:spcBef>
-                <a:spcPct val="0"/>
-              </a:spcBef>
-              <a:spcAft>
-                <a:spcPct val="0"/>
-              </a:spcAft>
-              <a:buClrTx/>
-              <a:buSzTx/>
-              <a:buFontTx/>
-              <a:buNone/>
-              <a:tabLst/>
-            </a:pPr>
-            <a:r>
-              <a:rPr kumimoji="0" lang="en-US" altLang="en-US" sz="1100" b="0" i="1" u="none" strike="noStrike" cap="none" normalizeH="0" baseline="0" dirty="0">
-                <a:ln>
-                  <a:noFill/>
-                </a:ln>
-                <a:solidFill>
-                  <a:schemeClr val="tx1"/>
-                </a:solidFill>
-                <a:effectLst/>
-                <a:latin typeface="Sylfaen" panose="010A0502050306030303" pitchFamily="18" charset="0"/>
-                <a:ea typeface="Calibri" panose="020F0502020204030204" pitchFamily="34" charset="0"/>
-                <a:cs typeface="Times New Roman" panose="02020603050405020304" pitchFamily="18" charset="0"/>
-              </a:rPr>
-              <a:t>Right</a:t>
-            </a:r>
-            <a:endParaRPr kumimoji="0" lang="en-US" altLang="en-US" sz="2400" b="0" i="0" u="none" strike="noStrike" cap="none" normalizeH="0" baseline="0" dirty="0">
-              <a:ln>
-                <a:noFill/>
-              </a:ln>
-              <a:solidFill>
-                <a:schemeClr val="tx1"/>
-              </a:solidFill>
-              <a:effectLst/>
-              <a:latin typeface="Arial" panose="020B0604020202020204" pitchFamily="34" charset="0"/>
-            </a:endParaRPr>
-          </a:p>
-        </p:txBody>
-      </p:sp>
       <p:grpSp>
         <p:nvGrpSpPr>
           <p:cNvPr id="10" name="Group 9">
@@ -13612,9 +13296,9 @@
           <p:nvPr/>
         </p:nvCxnSpPr>
         <p:spPr>
-          <a:xfrm>
-            <a:off x="5762755" y="158420"/>
-            <a:ext cx="53132" cy="6540521"/>
+          <a:xfrm flipH="1">
+            <a:off x="5815887" y="193209"/>
+            <a:ext cx="4697" cy="6505732"/>
           </a:xfrm>
           <a:prstGeom prst="line">
             <a:avLst/>
@@ -14628,9 +14312,10 @@
             <a:lstStyle/>
             <a:p>
               <a:r>
-                <a:rPr lang="en-US" dirty="0"/>
+                <a:rPr lang="en-US" dirty="0" err="1"/>
                 <a:t>Sh</a:t>
               </a:r>
+              <a:endParaRPr lang="en-US" dirty="0"/>
             </a:p>
           </p:txBody>
         </p:sp>
@@ -15151,10 +14836,10 @@
         </p:nvGrpSpPr>
         <p:grpSpPr>
           <a:xfrm>
-            <a:off x="6168384" y="2013332"/>
-            <a:ext cx="2163017" cy="1393762"/>
+            <a:off x="6064118" y="2037119"/>
+            <a:ext cx="2163017" cy="1398123"/>
             <a:chOff x="6137613" y="3877554"/>
-            <a:chExt cx="2163017" cy="1393762"/>
+            <a:chExt cx="2163017" cy="1398123"/>
           </a:xfrm>
         </p:grpSpPr>
         <p:sp>
@@ -15173,7 +14858,7 @@
           </p:nvSpPr>
           <p:spPr bwMode="auto">
             <a:xfrm>
-              <a:off x="7364444" y="5035069"/>
+              <a:off x="7363887" y="5039430"/>
               <a:ext cx="854299" cy="236247"/>
             </a:xfrm>
             <a:prstGeom prst="rect">
@@ -15774,7 +15459,7 @@
         </p:nvGrpSpPr>
         <p:grpSpPr>
           <a:xfrm>
-            <a:off x="6157096" y="638261"/>
+            <a:off x="6052830" y="662048"/>
             <a:ext cx="2118933" cy="1373878"/>
             <a:chOff x="6117801" y="5365834"/>
             <a:chExt cx="2118933" cy="1373878"/>
@@ -16627,6 +16312,36 @@
     <p:extLst>
       <p:ext uri="{BB962C8B-B14F-4D97-AF65-F5344CB8AC3E}">
         <p14:creationId xmlns:p14="http://schemas.microsoft.com/office/powerpoint/2010/main" val="3815183266"/>
+      </p:ext>
+    </p:extLst>
+  </p:cSld>
+  <p:clrMapOvr>
+    <a:masterClrMapping/>
+  </p:clrMapOvr>
+</p:sld>
+</file>
+
+<file path=ppt/slides/slide4.xml><?xml version="1.0" encoding="utf-8"?>
+<p:sld xmlns:a="http://schemas.openxmlformats.org/drawingml/2006/main" xmlns:r="http://schemas.openxmlformats.org/officeDocument/2006/relationships" xmlns:p="http://schemas.openxmlformats.org/presentationml/2006/main">
+  <p:cSld>
+    <p:spTree>
+      <p:nvGrpSpPr>
+        <p:cNvPr id="1" name=""/>
+        <p:cNvGrpSpPr/>
+        <p:nvPr/>
+      </p:nvGrpSpPr>
+      <p:grpSpPr>
+        <a:xfrm>
+          <a:off x="0" y="0"/>
+          <a:ext cx="0" cy="0"/>
+          <a:chOff x="0" y="0"/>
+          <a:chExt cx="0" cy="0"/>
+        </a:xfrm>
+      </p:grpSpPr>
+    </p:spTree>
+    <p:extLst>
+      <p:ext uri="{BB962C8B-B14F-4D97-AF65-F5344CB8AC3E}">
+        <p14:creationId xmlns:p14="http://schemas.microsoft.com/office/powerpoint/2010/main" val="3052025937"/>
       </p:ext>
     </p:extLst>
   </p:cSld>

</xml_diff>